<commit_message>
work work work work work
</commit_message>
<xml_diff>
--- a/Results_presentation.pptx
+++ b/Results_presentation.pptx
@@ -268,7 +268,7 @@
           <a:p>
             <a:fld id="{4A2FDB5B-C9D2-4FF8-8C39-B98838B722B0}" type="datetimeFigureOut">
               <a:rPr lang="en-AT" smtClean="0"/>
-              <a:t>04/05/2022</a:t>
+              <a:t>13/05/2022</a:t>
             </a:fld>
             <a:endParaRPr lang="en-AT"/>
           </a:p>
@@ -468,7 +468,7 @@
           <a:p>
             <a:fld id="{4A2FDB5B-C9D2-4FF8-8C39-B98838B722B0}" type="datetimeFigureOut">
               <a:rPr lang="en-AT" smtClean="0"/>
-              <a:t>04/05/2022</a:t>
+              <a:t>13/05/2022</a:t>
             </a:fld>
             <a:endParaRPr lang="en-AT"/>
           </a:p>
@@ -678,7 +678,7 @@
           <a:p>
             <a:fld id="{4A2FDB5B-C9D2-4FF8-8C39-B98838B722B0}" type="datetimeFigureOut">
               <a:rPr lang="en-AT" smtClean="0"/>
-              <a:t>04/05/2022</a:t>
+              <a:t>13/05/2022</a:t>
             </a:fld>
             <a:endParaRPr lang="en-AT"/>
           </a:p>
@@ -878,7 +878,7 @@
           <a:p>
             <a:fld id="{4A2FDB5B-C9D2-4FF8-8C39-B98838B722B0}" type="datetimeFigureOut">
               <a:rPr lang="en-AT" smtClean="0"/>
-              <a:t>04/05/2022</a:t>
+              <a:t>13/05/2022</a:t>
             </a:fld>
             <a:endParaRPr lang="en-AT"/>
           </a:p>
@@ -1154,7 +1154,7 @@
           <a:p>
             <a:fld id="{4A2FDB5B-C9D2-4FF8-8C39-B98838B722B0}" type="datetimeFigureOut">
               <a:rPr lang="en-AT" smtClean="0"/>
-              <a:t>04/05/2022</a:t>
+              <a:t>13/05/2022</a:t>
             </a:fld>
             <a:endParaRPr lang="en-AT"/>
           </a:p>
@@ -1422,7 +1422,7 @@
           <a:p>
             <a:fld id="{4A2FDB5B-C9D2-4FF8-8C39-B98838B722B0}" type="datetimeFigureOut">
               <a:rPr lang="en-AT" smtClean="0"/>
-              <a:t>04/05/2022</a:t>
+              <a:t>13/05/2022</a:t>
             </a:fld>
             <a:endParaRPr lang="en-AT"/>
           </a:p>
@@ -1837,7 +1837,7 @@
           <a:p>
             <a:fld id="{4A2FDB5B-C9D2-4FF8-8C39-B98838B722B0}" type="datetimeFigureOut">
               <a:rPr lang="en-AT" smtClean="0"/>
-              <a:t>04/05/2022</a:t>
+              <a:t>13/05/2022</a:t>
             </a:fld>
             <a:endParaRPr lang="en-AT"/>
           </a:p>
@@ -1979,7 +1979,7 @@
           <a:p>
             <a:fld id="{4A2FDB5B-C9D2-4FF8-8C39-B98838B722B0}" type="datetimeFigureOut">
               <a:rPr lang="en-AT" smtClean="0"/>
-              <a:t>04/05/2022</a:t>
+              <a:t>13/05/2022</a:t>
             </a:fld>
             <a:endParaRPr lang="en-AT"/>
           </a:p>
@@ -2092,7 +2092,7 @@
           <a:p>
             <a:fld id="{4A2FDB5B-C9D2-4FF8-8C39-B98838B722B0}" type="datetimeFigureOut">
               <a:rPr lang="en-AT" smtClean="0"/>
-              <a:t>04/05/2022</a:t>
+              <a:t>13/05/2022</a:t>
             </a:fld>
             <a:endParaRPr lang="en-AT"/>
           </a:p>
@@ -2405,7 +2405,7 @@
           <a:p>
             <a:fld id="{4A2FDB5B-C9D2-4FF8-8C39-B98838B722B0}" type="datetimeFigureOut">
               <a:rPr lang="en-AT" smtClean="0"/>
-              <a:t>04/05/2022</a:t>
+              <a:t>13/05/2022</a:t>
             </a:fld>
             <a:endParaRPr lang="en-AT"/>
           </a:p>
@@ -2694,7 +2694,7 @@
           <a:p>
             <a:fld id="{4A2FDB5B-C9D2-4FF8-8C39-B98838B722B0}" type="datetimeFigureOut">
               <a:rPr lang="en-AT" smtClean="0"/>
-              <a:t>04/05/2022</a:t>
+              <a:t>13/05/2022</a:t>
             </a:fld>
             <a:endParaRPr lang="en-AT"/>
           </a:p>
@@ -2937,7 +2937,7 @@
           <a:p>
             <a:fld id="{4A2FDB5B-C9D2-4FF8-8C39-B98838B722B0}" type="datetimeFigureOut">
               <a:rPr lang="en-AT" smtClean="0"/>
-              <a:t>04/05/2022</a:t>
+              <a:t>13/05/2022</a:t>
             </a:fld>
             <a:endParaRPr lang="en-AT"/>
           </a:p>
@@ -3609,7 +3609,7 @@
 </file>
 
 <file path=ppt/slides/slide3.xml><?xml version="1.0" encoding="utf-8"?>
-<p:sld xmlns:a="http://schemas.openxmlformats.org/drawingml/2006/main" xmlns:r="http://schemas.openxmlformats.org/officeDocument/2006/relationships" xmlns:p="http://schemas.openxmlformats.org/presentationml/2006/main">
+<p:sld xmlns:a="http://schemas.openxmlformats.org/drawingml/2006/main" xmlns:r="http://schemas.openxmlformats.org/officeDocument/2006/relationships" xmlns:p="http://schemas.openxmlformats.org/presentationml/2006/main" show="0">
   <p:cSld>
     <p:spTree>
       <p:nvGrpSpPr>

</xml_diff>

<commit_message>
A lot of stuff
</commit_message>
<xml_diff>
--- a/Results_presentation.pptx
+++ b/Results_presentation.pptx
@@ -13,6 +13,17 @@
     <p:sldId id="260" r:id="rId7"/>
     <p:sldId id="263" r:id="rId8"/>
     <p:sldId id="259" r:id="rId9"/>
+    <p:sldId id="266" r:id="rId10"/>
+    <p:sldId id="264" r:id="rId11"/>
+    <p:sldId id="265" r:id="rId12"/>
+    <p:sldId id="267" r:id="rId13"/>
+    <p:sldId id="268" r:id="rId14"/>
+    <p:sldId id="269" r:id="rId15"/>
+    <p:sldId id="270" r:id="rId16"/>
+    <p:sldId id="271" r:id="rId17"/>
+    <p:sldId id="272" r:id="rId18"/>
+    <p:sldId id="273" r:id="rId19"/>
+    <p:sldId id="274" r:id="rId20"/>
   </p:sldIdLst>
   <p:sldSz cx="12192000" cy="6858000"/>
   <p:notesSz cx="6858000" cy="9144000"/>
@@ -268,7 +279,7 @@
           <a:p>
             <a:fld id="{4A2FDB5B-C9D2-4FF8-8C39-B98838B722B0}" type="datetimeFigureOut">
               <a:rPr lang="en-AT" smtClean="0"/>
-              <a:t>13/05/2022</a:t>
+              <a:t>17/05/2022</a:t>
             </a:fld>
             <a:endParaRPr lang="en-AT"/>
           </a:p>
@@ -468,7 +479,7 @@
           <a:p>
             <a:fld id="{4A2FDB5B-C9D2-4FF8-8C39-B98838B722B0}" type="datetimeFigureOut">
               <a:rPr lang="en-AT" smtClean="0"/>
-              <a:t>13/05/2022</a:t>
+              <a:t>17/05/2022</a:t>
             </a:fld>
             <a:endParaRPr lang="en-AT"/>
           </a:p>
@@ -678,7 +689,7 @@
           <a:p>
             <a:fld id="{4A2FDB5B-C9D2-4FF8-8C39-B98838B722B0}" type="datetimeFigureOut">
               <a:rPr lang="en-AT" smtClean="0"/>
-              <a:t>13/05/2022</a:t>
+              <a:t>17/05/2022</a:t>
             </a:fld>
             <a:endParaRPr lang="en-AT"/>
           </a:p>
@@ -878,7 +889,7 @@
           <a:p>
             <a:fld id="{4A2FDB5B-C9D2-4FF8-8C39-B98838B722B0}" type="datetimeFigureOut">
               <a:rPr lang="en-AT" smtClean="0"/>
-              <a:t>13/05/2022</a:t>
+              <a:t>17/05/2022</a:t>
             </a:fld>
             <a:endParaRPr lang="en-AT"/>
           </a:p>
@@ -1154,7 +1165,7 @@
           <a:p>
             <a:fld id="{4A2FDB5B-C9D2-4FF8-8C39-B98838B722B0}" type="datetimeFigureOut">
               <a:rPr lang="en-AT" smtClean="0"/>
-              <a:t>13/05/2022</a:t>
+              <a:t>17/05/2022</a:t>
             </a:fld>
             <a:endParaRPr lang="en-AT"/>
           </a:p>
@@ -1422,7 +1433,7 @@
           <a:p>
             <a:fld id="{4A2FDB5B-C9D2-4FF8-8C39-B98838B722B0}" type="datetimeFigureOut">
               <a:rPr lang="en-AT" smtClean="0"/>
-              <a:t>13/05/2022</a:t>
+              <a:t>17/05/2022</a:t>
             </a:fld>
             <a:endParaRPr lang="en-AT"/>
           </a:p>
@@ -1837,7 +1848,7 @@
           <a:p>
             <a:fld id="{4A2FDB5B-C9D2-4FF8-8C39-B98838B722B0}" type="datetimeFigureOut">
               <a:rPr lang="en-AT" smtClean="0"/>
-              <a:t>13/05/2022</a:t>
+              <a:t>17/05/2022</a:t>
             </a:fld>
             <a:endParaRPr lang="en-AT"/>
           </a:p>
@@ -1979,7 +1990,7 @@
           <a:p>
             <a:fld id="{4A2FDB5B-C9D2-4FF8-8C39-B98838B722B0}" type="datetimeFigureOut">
               <a:rPr lang="en-AT" smtClean="0"/>
-              <a:t>13/05/2022</a:t>
+              <a:t>17/05/2022</a:t>
             </a:fld>
             <a:endParaRPr lang="en-AT"/>
           </a:p>
@@ -2092,7 +2103,7 @@
           <a:p>
             <a:fld id="{4A2FDB5B-C9D2-4FF8-8C39-B98838B722B0}" type="datetimeFigureOut">
               <a:rPr lang="en-AT" smtClean="0"/>
-              <a:t>13/05/2022</a:t>
+              <a:t>17/05/2022</a:t>
             </a:fld>
             <a:endParaRPr lang="en-AT"/>
           </a:p>
@@ -2405,7 +2416,7 @@
           <a:p>
             <a:fld id="{4A2FDB5B-C9D2-4FF8-8C39-B98838B722B0}" type="datetimeFigureOut">
               <a:rPr lang="en-AT" smtClean="0"/>
-              <a:t>13/05/2022</a:t>
+              <a:t>17/05/2022</a:t>
             </a:fld>
             <a:endParaRPr lang="en-AT"/>
           </a:p>
@@ -2694,7 +2705,7 @@
           <a:p>
             <a:fld id="{4A2FDB5B-C9D2-4FF8-8C39-B98838B722B0}" type="datetimeFigureOut">
               <a:rPr lang="en-AT" smtClean="0"/>
-              <a:t>13/05/2022</a:t>
+              <a:t>17/05/2022</a:t>
             </a:fld>
             <a:endParaRPr lang="en-AT"/>
           </a:p>
@@ -2937,7 +2948,7 @@
           <a:p>
             <a:fld id="{4A2FDB5B-C9D2-4FF8-8C39-B98838B722B0}" type="datetimeFigureOut">
               <a:rPr lang="en-AT" smtClean="0"/>
-              <a:t>13/05/2022</a:t>
+              <a:t>17/05/2022</a:t>
             </a:fld>
             <a:endParaRPr lang="en-AT"/>
           </a:p>
@@ -3417,6 +3428,820 @@
 </p:sld>
 </file>
 
+<file path=ppt/slides/slide10.xml><?xml version="1.0" encoding="utf-8"?>
+<p:sld xmlns:a="http://schemas.openxmlformats.org/drawingml/2006/main" xmlns:r="http://schemas.openxmlformats.org/officeDocument/2006/relationships" xmlns:p="http://schemas.openxmlformats.org/presentationml/2006/main">
+  <p:cSld>
+    <p:spTree>
+      <p:nvGrpSpPr>
+        <p:cNvPr id="1" name=""/>
+        <p:cNvGrpSpPr/>
+        <p:nvPr/>
+      </p:nvGrpSpPr>
+      <p:grpSpPr>
+        <a:xfrm>
+          <a:off x="0" y="0"/>
+          <a:ext cx="0" cy="0"/>
+          <a:chOff x="0" y="0"/>
+          <a:chExt cx="0" cy="0"/>
+        </a:xfrm>
+      </p:grpSpPr>
+      <p:pic>
+        <p:nvPicPr>
+          <p:cNvPr id="4" name="Picture 3">
+            <a:extLst>
+              <a:ext uri="{FF2B5EF4-FFF2-40B4-BE49-F238E27FC236}">
+                <a16:creationId xmlns:a16="http://schemas.microsoft.com/office/drawing/2014/main" id="{FA2B3C64-BB65-13EA-A638-14F4416C00F8}"/>
+              </a:ext>
+            </a:extLst>
+          </p:cNvPr>
+          <p:cNvPicPr>
+            <a:picLocks noChangeAspect="1"/>
+          </p:cNvPicPr>
+          <p:nvPr/>
+        </p:nvPicPr>
+        <p:blipFill>
+          <a:blip r:embed="rId2"/>
+          <a:stretch>
+            <a:fillRect/>
+          </a:stretch>
+        </p:blipFill>
+        <p:spPr>
+          <a:xfrm>
+            <a:off x="997382" y="0"/>
+            <a:ext cx="10197235" cy="6858000"/>
+          </a:xfrm>
+          <a:prstGeom prst="rect">
+            <a:avLst/>
+          </a:prstGeom>
+        </p:spPr>
+      </p:pic>
+    </p:spTree>
+    <p:extLst>
+      <p:ext uri="{BB962C8B-B14F-4D97-AF65-F5344CB8AC3E}">
+        <p14:creationId xmlns:p14="http://schemas.microsoft.com/office/powerpoint/2010/main" val="3995485336"/>
+      </p:ext>
+    </p:extLst>
+  </p:cSld>
+  <p:clrMapOvr>
+    <a:masterClrMapping/>
+  </p:clrMapOvr>
+</p:sld>
+</file>
+
+<file path=ppt/slides/slide11.xml><?xml version="1.0" encoding="utf-8"?>
+<p:sld xmlns:a="http://schemas.openxmlformats.org/drawingml/2006/main" xmlns:r="http://schemas.openxmlformats.org/officeDocument/2006/relationships" xmlns:p="http://schemas.openxmlformats.org/presentationml/2006/main">
+  <p:cSld>
+    <p:spTree>
+      <p:nvGrpSpPr>
+        <p:cNvPr id="1" name=""/>
+        <p:cNvGrpSpPr/>
+        <p:nvPr/>
+      </p:nvGrpSpPr>
+      <p:grpSpPr>
+        <a:xfrm>
+          <a:off x="0" y="0"/>
+          <a:ext cx="0" cy="0"/>
+          <a:chOff x="0" y="0"/>
+          <a:chExt cx="0" cy="0"/>
+        </a:xfrm>
+      </p:grpSpPr>
+      <p:pic>
+        <p:nvPicPr>
+          <p:cNvPr id="4" name="Picture 3">
+            <a:extLst>
+              <a:ext uri="{FF2B5EF4-FFF2-40B4-BE49-F238E27FC236}">
+                <a16:creationId xmlns:a16="http://schemas.microsoft.com/office/drawing/2014/main" id="{5A900D8F-AAEB-7B49-371C-AFCB5B493FE9}"/>
+              </a:ext>
+            </a:extLst>
+          </p:cNvPr>
+          <p:cNvPicPr>
+            <a:picLocks noChangeAspect="1"/>
+          </p:cNvPicPr>
+          <p:nvPr/>
+        </p:nvPicPr>
+        <p:blipFill>
+          <a:blip r:embed="rId2"/>
+          <a:stretch>
+            <a:fillRect/>
+          </a:stretch>
+        </p:blipFill>
+        <p:spPr>
+          <a:xfrm>
+            <a:off x="1477460" y="0"/>
+            <a:ext cx="9237079" cy="6858000"/>
+          </a:xfrm>
+          <a:prstGeom prst="rect">
+            <a:avLst/>
+          </a:prstGeom>
+        </p:spPr>
+      </p:pic>
+    </p:spTree>
+    <p:extLst>
+      <p:ext uri="{BB962C8B-B14F-4D97-AF65-F5344CB8AC3E}">
+        <p14:creationId xmlns:p14="http://schemas.microsoft.com/office/powerpoint/2010/main" val="3142321669"/>
+      </p:ext>
+    </p:extLst>
+  </p:cSld>
+  <p:clrMapOvr>
+    <a:masterClrMapping/>
+  </p:clrMapOvr>
+</p:sld>
+</file>
+
+<file path=ppt/slides/slide12.xml><?xml version="1.0" encoding="utf-8"?>
+<p:sld xmlns:a="http://schemas.openxmlformats.org/drawingml/2006/main" xmlns:r="http://schemas.openxmlformats.org/officeDocument/2006/relationships" xmlns:p="http://schemas.openxmlformats.org/presentationml/2006/main">
+  <p:cSld>
+    <p:spTree>
+      <p:nvGrpSpPr>
+        <p:cNvPr id="1" name=""/>
+        <p:cNvGrpSpPr/>
+        <p:nvPr/>
+      </p:nvGrpSpPr>
+      <p:grpSpPr>
+        <a:xfrm>
+          <a:off x="0" y="0"/>
+          <a:ext cx="0" cy="0"/>
+          <a:chOff x="0" y="0"/>
+          <a:chExt cx="0" cy="0"/>
+        </a:xfrm>
+      </p:grpSpPr>
+      <p:pic>
+        <p:nvPicPr>
+          <p:cNvPr id="4" name="Picture 3">
+            <a:extLst>
+              <a:ext uri="{FF2B5EF4-FFF2-40B4-BE49-F238E27FC236}">
+                <a16:creationId xmlns:a16="http://schemas.microsoft.com/office/drawing/2014/main" id="{D40763B7-53FB-5B57-E10C-401C9DB03E7D}"/>
+              </a:ext>
+            </a:extLst>
+          </p:cNvPr>
+          <p:cNvPicPr>
+            <a:picLocks noChangeAspect="1"/>
+          </p:cNvPicPr>
+          <p:nvPr/>
+        </p:nvPicPr>
+        <p:blipFill>
+          <a:blip r:embed="rId2"/>
+          <a:stretch>
+            <a:fillRect/>
+          </a:stretch>
+        </p:blipFill>
+        <p:spPr>
+          <a:xfrm>
+            <a:off x="1513741" y="53873"/>
+            <a:ext cx="9164517" cy="6804127"/>
+          </a:xfrm>
+          <a:prstGeom prst="rect">
+            <a:avLst/>
+          </a:prstGeom>
+        </p:spPr>
+      </p:pic>
+    </p:spTree>
+    <p:extLst>
+      <p:ext uri="{BB962C8B-B14F-4D97-AF65-F5344CB8AC3E}">
+        <p14:creationId xmlns:p14="http://schemas.microsoft.com/office/powerpoint/2010/main" val="263052104"/>
+      </p:ext>
+    </p:extLst>
+  </p:cSld>
+  <p:clrMapOvr>
+    <a:masterClrMapping/>
+  </p:clrMapOvr>
+</p:sld>
+</file>
+
+<file path=ppt/slides/slide13.xml><?xml version="1.0" encoding="utf-8"?>
+<p:sld xmlns:a="http://schemas.openxmlformats.org/drawingml/2006/main" xmlns:r="http://schemas.openxmlformats.org/officeDocument/2006/relationships" xmlns:p="http://schemas.openxmlformats.org/presentationml/2006/main">
+  <p:cSld>
+    <p:spTree>
+      <p:nvGrpSpPr>
+        <p:cNvPr id="1" name=""/>
+        <p:cNvGrpSpPr/>
+        <p:nvPr/>
+      </p:nvGrpSpPr>
+      <p:grpSpPr>
+        <a:xfrm>
+          <a:off x="0" y="0"/>
+          <a:ext cx="0" cy="0"/>
+          <a:chOff x="0" y="0"/>
+          <a:chExt cx="0" cy="0"/>
+        </a:xfrm>
+      </p:grpSpPr>
+      <p:sp>
+        <p:nvSpPr>
+          <p:cNvPr id="2" name="Title 1">
+            <a:extLst>
+              <a:ext uri="{FF2B5EF4-FFF2-40B4-BE49-F238E27FC236}">
+                <a16:creationId xmlns:a16="http://schemas.microsoft.com/office/drawing/2014/main" id="{99EBA101-EEF8-C678-88F9-1E49978F897D}"/>
+              </a:ext>
+            </a:extLst>
+          </p:cNvPr>
+          <p:cNvSpPr>
+            <a:spLocks noGrp="1"/>
+          </p:cNvSpPr>
+          <p:nvPr>
+            <p:ph type="title"/>
+          </p:nvPr>
+        </p:nvSpPr>
+        <p:spPr/>
+        <p:txBody>
+          <a:bodyPr/>
+          <a:lstStyle/>
+          <a:p>
+            <a:endParaRPr lang="en-AT"/>
+          </a:p>
+        </p:txBody>
+      </p:sp>
+    </p:spTree>
+    <p:extLst>
+      <p:ext uri="{BB962C8B-B14F-4D97-AF65-F5344CB8AC3E}">
+        <p14:creationId xmlns:p14="http://schemas.microsoft.com/office/powerpoint/2010/main" val="3734291695"/>
+      </p:ext>
+    </p:extLst>
+  </p:cSld>
+  <p:clrMapOvr>
+    <a:masterClrMapping/>
+  </p:clrMapOvr>
+</p:sld>
+</file>
+
+<file path=ppt/slides/slide14.xml><?xml version="1.0" encoding="utf-8"?>
+<p:sld xmlns:a="http://schemas.openxmlformats.org/drawingml/2006/main" xmlns:r="http://schemas.openxmlformats.org/officeDocument/2006/relationships" xmlns:p="http://schemas.openxmlformats.org/presentationml/2006/main">
+  <p:cSld>
+    <p:spTree>
+      <p:nvGrpSpPr>
+        <p:cNvPr id="1" name=""/>
+        <p:cNvGrpSpPr/>
+        <p:nvPr/>
+      </p:nvGrpSpPr>
+      <p:grpSpPr>
+        <a:xfrm>
+          <a:off x="0" y="0"/>
+          <a:ext cx="0" cy="0"/>
+          <a:chOff x="0" y="0"/>
+          <a:chExt cx="0" cy="0"/>
+        </a:xfrm>
+      </p:grpSpPr>
+      <p:pic>
+        <p:nvPicPr>
+          <p:cNvPr id="10" name="Picture 9">
+            <a:extLst>
+              <a:ext uri="{FF2B5EF4-FFF2-40B4-BE49-F238E27FC236}">
+                <a16:creationId xmlns:a16="http://schemas.microsoft.com/office/drawing/2014/main" id="{4C63BCF8-F7A8-836D-08BA-3418E2C83A19}"/>
+              </a:ext>
+            </a:extLst>
+          </p:cNvPr>
+          <p:cNvPicPr>
+            <a:picLocks noChangeAspect="1"/>
+          </p:cNvPicPr>
+          <p:nvPr/>
+        </p:nvPicPr>
+        <p:blipFill>
+          <a:blip r:embed="rId2"/>
+          <a:stretch>
+            <a:fillRect/>
+          </a:stretch>
+        </p:blipFill>
+        <p:spPr>
+          <a:xfrm>
+            <a:off x="0" y="-174099"/>
+            <a:ext cx="5803641" cy="4075496"/>
+          </a:xfrm>
+          <a:prstGeom prst="rect">
+            <a:avLst/>
+          </a:prstGeom>
+        </p:spPr>
+      </p:pic>
+      <p:sp>
+        <p:nvSpPr>
+          <p:cNvPr id="7" name="TextBox 6">
+            <a:extLst>
+              <a:ext uri="{FF2B5EF4-FFF2-40B4-BE49-F238E27FC236}">
+                <a16:creationId xmlns:a16="http://schemas.microsoft.com/office/drawing/2014/main" id="{AD9335D8-3F51-AAFD-7E0C-103C2AFB778C}"/>
+              </a:ext>
+            </a:extLst>
+          </p:cNvPr>
+          <p:cNvSpPr txBox="1"/>
+          <p:nvPr/>
+        </p:nvSpPr>
+        <p:spPr>
+          <a:xfrm>
+            <a:off x="158620" y="3554963"/>
+            <a:ext cx="3340360" cy="369332"/>
+          </a:xfrm>
+          <a:prstGeom prst="rect">
+            <a:avLst/>
+          </a:prstGeom>
+          <a:noFill/>
+        </p:spPr>
+        <p:txBody>
+          <a:bodyPr wrap="square" rtlCol="0">
+            <a:spAutoFit/>
+          </a:bodyPr>
+          <a:lstStyle/>
+          <a:p>
+            <a:r>
+              <a:rPr lang="en-GB" dirty="0"/>
+              <a:t>Condition number: ~29.6</a:t>
+            </a:r>
+            <a:endParaRPr lang="en-AT" dirty="0"/>
+          </a:p>
+        </p:txBody>
+      </p:sp>
+      <p:pic>
+        <p:nvPicPr>
+          <p:cNvPr id="12" name="Picture 11">
+            <a:extLst>
+              <a:ext uri="{FF2B5EF4-FFF2-40B4-BE49-F238E27FC236}">
+                <a16:creationId xmlns:a16="http://schemas.microsoft.com/office/drawing/2014/main" id="{637FFD47-9404-5139-3853-61A4756B6014}"/>
+              </a:ext>
+            </a:extLst>
+          </p:cNvPr>
+          <p:cNvPicPr>
+            <a:picLocks noChangeAspect="1"/>
+          </p:cNvPicPr>
+          <p:nvPr/>
+        </p:nvPicPr>
+        <p:blipFill>
+          <a:blip r:embed="rId3"/>
+          <a:stretch>
+            <a:fillRect/>
+          </a:stretch>
+        </p:blipFill>
+        <p:spPr>
+          <a:xfrm>
+            <a:off x="5523722" y="2175330"/>
+            <a:ext cx="6668278" cy="4682670"/>
+          </a:xfrm>
+          <a:prstGeom prst="rect">
+            <a:avLst/>
+          </a:prstGeom>
+        </p:spPr>
+      </p:pic>
+      <p:sp>
+        <p:nvSpPr>
+          <p:cNvPr id="8" name="TextBox 7">
+            <a:extLst>
+              <a:ext uri="{FF2B5EF4-FFF2-40B4-BE49-F238E27FC236}">
+                <a16:creationId xmlns:a16="http://schemas.microsoft.com/office/drawing/2014/main" id="{51DEC32F-95FF-423F-8F2E-9F8FDC1DDDFB}"/>
+              </a:ext>
+            </a:extLst>
+          </p:cNvPr>
+          <p:cNvSpPr txBox="1"/>
+          <p:nvPr/>
+        </p:nvSpPr>
+        <p:spPr>
+          <a:xfrm>
+            <a:off x="8615265" y="1852164"/>
+            <a:ext cx="3340360" cy="646331"/>
+          </a:xfrm>
+          <a:prstGeom prst="rect">
+            <a:avLst/>
+          </a:prstGeom>
+          <a:noFill/>
+        </p:spPr>
+        <p:txBody>
+          <a:bodyPr wrap="square" rtlCol="0">
+            <a:spAutoFit/>
+          </a:bodyPr>
+          <a:lstStyle/>
+          <a:p>
+            <a:r>
+              <a:rPr lang="en-GB" dirty="0"/>
+              <a:t>Using </a:t>
+            </a:r>
+            <a:r>
+              <a:rPr lang="en-GB" dirty="0" err="1"/>
+              <a:t>sumNA</a:t>
+            </a:r>
+            <a:r>
+              <a:rPr lang="en-GB" dirty="0"/>
+              <a:t> and </a:t>
+            </a:r>
+            <a:r>
+              <a:rPr lang="en-GB" dirty="0" err="1"/>
+              <a:t>sumPA</a:t>
+            </a:r>
+            <a:br>
+              <a:rPr lang="en-GB" dirty="0"/>
+            </a:br>
+            <a:r>
+              <a:rPr lang="en-GB" dirty="0"/>
+              <a:t>Condition number: ~25.8</a:t>
+            </a:r>
+            <a:endParaRPr lang="en-AT" dirty="0"/>
+          </a:p>
+        </p:txBody>
+      </p:sp>
+    </p:spTree>
+    <p:extLst>
+      <p:ext uri="{BB962C8B-B14F-4D97-AF65-F5344CB8AC3E}">
+        <p14:creationId xmlns:p14="http://schemas.microsoft.com/office/powerpoint/2010/main" val="3327389475"/>
+      </p:ext>
+    </p:extLst>
+  </p:cSld>
+  <p:clrMapOvr>
+    <a:masterClrMapping/>
+  </p:clrMapOvr>
+</p:sld>
+</file>
+
+<file path=ppt/slides/slide15.xml><?xml version="1.0" encoding="utf-8"?>
+<p:sld xmlns:a="http://schemas.openxmlformats.org/drawingml/2006/main" xmlns:r="http://schemas.openxmlformats.org/officeDocument/2006/relationships" xmlns:p="http://schemas.openxmlformats.org/presentationml/2006/main">
+  <p:cSld>
+    <p:spTree>
+      <p:nvGrpSpPr>
+        <p:cNvPr id="1" name=""/>
+        <p:cNvGrpSpPr/>
+        <p:nvPr/>
+      </p:nvGrpSpPr>
+      <p:grpSpPr>
+        <a:xfrm>
+          <a:off x="0" y="0"/>
+          <a:ext cx="0" cy="0"/>
+          <a:chOff x="0" y="0"/>
+          <a:chExt cx="0" cy="0"/>
+        </a:xfrm>
+      </p:grpSpPr>
+      <p:sp>
+        <p:nvSpPr>
+          <p:cNvPr id="2" name="Title 1">
+            <a:extLst>
+              <a:ext uri="{FF2B5EF4-FFF2-40B4-BE49-F238E27FC236}">
+                <a16:creationId xmlns:a16="http://schemas.microsoft.com/office/drawing/2014/main" id="{9508ABAD-36D0-0175-C5B3-0C35BF77B159}"/>
+              </a:ext>
+            </a:extLst>
+          </p:cNvPr>
+          <p:cNvSpPr>
+            <a:spLocks noGrp="1"/>
+          </p:cNvSpPr>
+          <p:nvPr>
+            <p:ph type="title"/>
+          </p:nvPr>
+        </p:nvSpPr>
+        <p:spPr/>
+        <p:txBody>
+          <a:bodyPr/>
+          <a:lstStyle/>
+          <a:p>
+            <a:endParaRPr lang="en-AT"/>
+          </a:p>
+        </p:txBody>
+      </p:sp>
+    </p:spTree>
+    <p:extLst>
+      <p:ext uri="{BB962C8B-B14F-4D97-AF65-F5344CB8AC3E}">
+        <p14:creationId xmlns:p14="http://schemas.microsoft.com/office/powerpoint/2010/main" val="2264943652"/>
+      </p:ext>
+    </p:extLst>
+  </p:cSld>
+  <p:clrMapOvr>
+    <a:masterClrMapping/>
+  </p:clrMapOvr>
+</p:sld>
+</file>
+
+<file path=ppt/slides/slide16.xml><?xml version="1.0" encoding="utf-8"?>
+<p:sld xmlns:a="http://schemas.openxmlformats.org/drawingml/2006/main" xmlns:r="http://schemas.openxmlformats.org/officeDocument/2006/relationships" xmlns:p="http://schemas.openxmlformats.org/presentationml/2006/main">
+  <p:cSld>
+    <p:spTree>
+      <p:nvGrpSpPr>
+        <p:cNvPr id="1" name=""/>
+        <p:cNvGrpSpPr/>
+        <p:nvPr/>
+      </p:nvGrpSpPr>
+      <p:grpSpPr>
+        <a:xfrm>
+          <a:off x="0" y="0"/>
+          <a:ext cx="0" cy="0"/>
+          <a:chOff x="0" y="0"/>
+          <a:chExt cx="0" cy="0"/>
+        </a:xfrm>
+      </p:grpSpPr>
+      <p:sp>
+        <p:nvSpPr>
+          <p:cNvPr id="2" name="Title 1">
+            <a:extLst>
+              <a:ext uri="{FF2B5EF4-FFF2-40B4-BE49-F238E27FC236}">
+                <a16:creationId xmlns:a16="http://schemas.microsoft.com/office/drawing/2014/main" id="{4F70FCDA-9CF1-0C8C-488A-2FD7F6688E74}"/>
+              </a:ext>
+            </a:extLst>
+          </p:cNvPr>
+          <p:cNvSpPr>
+            <a:spLocks noGrp="1"/>
+          </p:cNvSpPr>
+          <p:nvPr>
+            <p:ph type="title"/>
+          </p:nvPr>
+        </p:nvSpPr>
+        <p:spPr/>
+        <p:txBody>
+          <a:bodyPr/>
+          <a:lstStyle/>
+          <a:p>
+            <a:endParaRPr lang="en-AT"/>
+          </a:p>
+        </p:txBody>
+      </p:sp>
+    </p:spTree>
+    <p:extLst>
+      <p:ext uri="{BB962C8B-B14F-4D97-AF65-F5344CB8AC3E}">
+        <p14:creationId xmlns:p14="http://schemas.microsoft.com/office/powerpoint/2010/main" val="3120278666"/>
+      </p:ext>
+    </p:extLst>
+  </p:cSld>
+  <p:clrMapOvr>
+    <a:masterClrMapping/>
+  </p:clrMapOvr>
+</p:sld>
+</file>
+
+<file path=ppt/slides/slide17.xml><?xml version="1.0" encoding="utf-8"?>
+<p:sld xmlns:a="http://schemas.openxmlformats.org/drawingml/2006/main" xmlns:r="http://schemas.openxmlformats.org/officeDocument/2006/relationships" xmlns:p="http://schemas.openxmlformats.org/presentationml/2006/main">
+  <p:cSld>
+    <p:spTree>
+      <p:nvGrpSpPr>
+        <p:cNvPr id="1" name=""/>
+        <p:cNvGrpSpPr/>
+        <p:nvPr/>
+      </p:nvGrpSpPr>
+      <p:grpSpPr>
+        <a:xfrm>
+          <a:off x="0" y="0"/>
+          <a:ext cx="0" cy="0"/>
+          <a:chOff x="0" y="0"/>
+          <a:chExt cx="0" cy="0"/>
+        </a:xfrm>
+      </p:grpSpPr>
+      <p:sp>
+        <p:nvSpPr>
+          <p:cNvPr id="2" name="Title 1">
+            <a:extLst>
+              <a:ext uri="{FF2B5EF4-FFF2-40B4-BE49-F238E27FC236}">
+                <a16:creationId xmlns:a16="http://schemas.microsoft.com/office/drawing/2014/main" id="{783647F6-1B39-EBB4-18F8-CF1EF3449532}"/>
+              </a:ext>
+            </a:extLst>
+          </p:cNvPr>
+          <p:cNvSpPr>
+            <a:spLocks noGrp="1"/>
+          </p:cNvSpPr>
+          <p:nvPr>
+            <p:ph type="title"/>
+          </p:nvPr>
+        </p:nvSpPr>
+        <p:spPr>
+          <a:xfrm>
+            <a:off x="634482" y="365126"/>
+            <a:ext cx="10719318" cy="418646"/>
+          </a:xfrm>
+        </p:spPr>
+        <p:txBody>
+          <a:bodyPr>
+            <a:normAutofit/>
+          </a:bodyPr>
+          <a:lstStyle/>
+          <a:p>
+            <a:r>
+              <a:rPr lang="en-GB" sz="2000" dirty="0"/>
+              <a:t>All participants</a:t>
+            </a:r>
+            <a:endParaRPr lang="en-AT" sz="2000" dirty="0"/>
+          </a:p>
+        </p:txBody>
+      </p:sp>
+      <p:pic>
+        <p:nvPicPr>
+          <p:cNvPr id="4" name="Picture 3">
+            <a:extLst>
+              <a:ext uri="{FF2B5EF4-FFF2-40B4-BE49-F238E27FC236}">
+                <a16:creationId xmlns:a16="http://schemas.microsoft.com/office/drawing/2014/main" id="{48EB0C4D-2C65-8A3F-3F2C-79B6A3B697B7}"/>
+              </a:ext>
+            </a:extLst>
+          </p:cNvPr>
+          <p:cNvPicPr>
+            <a:picLocks noChangeAspect="1"/>
+          </p:cNvPicPr>
+          <p:nvPr/>
+        </p:nvPicPr>
+        <p:blipFill>
+          <a:blip r:embed="rId2"/>
+          <a:stretch>
+            <a:fillRect/>
+          </a:stretch>
+        </p:blipFill>
+        <p:spPr>
+          <a:xfrm>
+            <a:off x="1561707" y="783772"/>
+            <a:ext cx="9068586" cy="5829805"/>
+          </a:xfrm>
+          <a:prstGeom prst="rect">
+            <a:avLst/>
+          </a:prstGeom>
+        </p:spPr>
+      </p:pic>
+    </p:spTree>
+    <p:extLst>
+      <p:ext uri="{BB962C8B-B14F-4D97-AF65-F5344CB8AC3E}">
+        <p14:creationId xmlns:p14="http://schemas.microsoft.com/office/powerpoint/2010/main" val="1848602586"/>
+      </p:ext>
+    </p:extLst>
+  </p:cSld>
+  <p:clrMapOvr>
+    <a:masterClrMapping/>
+  </p:clrMapOvr>
+</p:sld>
+</file>
+
+<file path=ppt/slides/slide18.xml><?xml version="1.0" encoding="utf-8"?>
+<p:sld xmlns:a="http://schemas.openxmlformats.org/drawingml/2006/main" xmlns:r="http://schemas.openxmlformats.org/officeDocument/2006/relationships" xmlns:p="http://schemas.openxmlformats.org/presentationml/2006/main">
+  <p:cSld>
+    <p:spTree>
+      <p:nvGrpSpPr>
+        <p:cNvPr id="1" name=""/>
+        <p:cNvGrpSpPr/>
+        <p:nvPr/>
+      </p:nvGrpSpPr>
+      <p:grpSpPr>
+        <a:xfrm>
+          <a:off x="0" y="0"/>
+          <a:ext cx="0" cy="0"/>
+          <a:chOff x="0" y="0"/>
+          <a:chExt cx="0" cy="0"/>
+        </a:xfrm>
+      </p:grpSpPr>
+      <p:pic>
+        <p:nvPicPr>
+          <p:cNvPr id="4" name="Picture 3">
+            <a:extLst>
+              <a:ext uri="{FF2B5EF4-FFF2-40B4-BE49-F238E27FC236}">
+                <a16:creationId xmlns:a16="http://schemas.microsoft.com/office/drawing/2014/main" id="{6D29AD5C-315C-9EFE-7C9D-1E9A592EE931}"/>
+              </a:ext>
+            </a:extLst>
+          </p:cNvPr>
+          <p:cNvPicPr>
+            <a:picLocks noChangeAspect="1"/>
+          </p:cNvPicPr>
+          <p:nvPr/>
+        </p:nvPicPr>
+        <p:blipFill>
+          <a:blip r:embed="rId2"/>
+          <a:stretch>
+            <a:fillRect/>
+          </a:stretch>
+        </p:blipFill>
+        <p:spPr>
+          <a:xfrm>
+            <a:off x="1961791" y="514097"/>
+            <a:ext cx="8268417" cy="5829805"/>
+          </a:xfrm>
+          <a:prstGeom prst="rect">
+            <a:avLst/>
+          </a:prstGeom>
+        </p:spPr>
+      </p:pic>
+      <p:sp>
+        <p:nvSpPr>
+          <p:cNvPr id="5" name="Title 1">
+            <a:extLst>
+              <a:ext uri="{FF2B5EF4-FFF2-40B4-BE49-F238E27FC236}">
+                <a16:creationId xmlns:a16="http://schemas.microsoft.com/office/drawing/2014/main" id="{A1F4311C-A384-3CD2-7E08-0C49CCE15C14}"/>
+              </a:ext>
+            </a:extLst>
+          </p:cNvPr>
+          <p:cNvSpPr>
+            <a:spLocks noGrp="1"/>
+          </p:cNvSpPr>
+          <p:nvPr>
+            <p:ph type="title"/>
+          </p:nvPr>
+        </p:nvSpPr>
+        <p:spPr>
+          <a:xfrm>
+            <a:off x="634482" y="365126"/>
+            <a:ext cx="10719318" cy="418646"/>
+          </a:xfrm>
+        </p:spPr>
+        <p:txBody>
+          <a:bodyPr>
+            <a:normAutofit/>
+          </a:bodyPr>
+          <a:lstStyle/>
+          <a:p>
+            <a:r>
+              <a:rPr lang="en-GB" sz="2000" dirty="0"/>
+              <a:t>Controls</a:t>
+            </a:r>
+            <a:endParaRPr lang="en-AT" sz="2000" dirty="0"/>
+          </a:p>
+        </p:txBody>
+      </p:sp>
+    </p:spTree>
+    <p:extLst>
+      <p:ext uri="{BB962C8B-B14F-4D97-AF65-F5344CB8AC3E}">
+        <p14:creationId xmlns:p14="http://schemas.microsoft.com/office/powerpoint/2010/main" val="1249007751"/>
+      </p:ext>
+    </p:extLst>
+  </p:cSld>
+  <p:clrMapOvr>
+    <a:masterClrMapping/>
+  </p:clrMapOvr>
+</p:sld>
+</file>
+
+<file path=ppt/slides/slide19.xml><?xml version="1.0" encoding="utf-8"?>
+<p:sld xmlns:a="http://schemas.openxmlformats.org/drawingml/2006/main" xmlns:r="http://schemas.openxmlformats.org/officeDocument/2006/relationships" xmlns:p="http://schemas.openxmlformats.org/presentationml/2006/main">
+  <p:cSld>
+    <p:spTree>
+      <p:nvGrpSpPr>
+        <p:cNvPr id="1" name=""/>
+        <p:cNvGrpSpPr/>
+        <p:nvPr/>
+      </p:nvGrpSpPr>
+      <p:grpSpPr>
+        <a:xfrm>
+          <a:off x="0" y="0"/>
+          <a:ext cx="0" cy="0"/>
+          <a:chOff x="0" y="0"/>
+          <a:chExt cx="0" cy="0"/>
+        </a:xfrm>
+      </p:grpSpPr>
+      <p:sp>
+        <p:nvSpPr>
+          <p:cNvPr id="3" name="Title 1">
+            <a:extLst>
+              <a:ext uri="{FF2B5EF4-FFF2-40B4-BE49-F238E27FC236}">
+                <a16:creationId xmlns:a16="http://schemas.microsoft.com/office/drawing/2014/main" id="{823A12A8-8A12-2DAC-582B-070F88F49186}"/>
+              </a:ext>
+            </a:extLst>
+          </p:cNvPr>
+          <p:cNvSpPr>
+            <a:spLocks noGrp="1"/>
+          </p:cNvSpPr>
+          <p:nvPr>
+            <p:ph type="title"/>
+          </p:nvPr>
+        </p:nvSpPr>
+        <p:spPr>
+          <a:xfrm>
+            <a:off x="634482" y="365126"/>
+            <a:ext cx="10719318" cy="418646"/>
+          </a:xfrm>
+        </p:spPr>
+        <p:txBody>
+          <a:bodyPr>
+            <a:normAutofit/>
+          </a:bodyPr>
+          <a:lstStyle/>
+          <a:p>
+            <a:r>
+              <a:rPr lang="en-GB" sz="2000" dirty="0"/>
+              <a:t>Remitted</a:t>
+            </a:r>
+            <a:endParaRPr lang="en-AT" sz="2000" dirty="0"/>
+          </a:p>
+        </p:txBody>
+      </p:sp>
+      <p:pic>
+        <p:nvPicPr>
+          <p:cNvPr id="5" name="Picture 4">
+            <a:extLst>
+              <a:ext uri="{FF2B5EF4-FFF2-40B4-BE49-F238E27FC236}">
+                <a16:creationId xmlns:a16="http://schemas.microsoft.com/office/drawing/2014/main" id="{BD8F4022-837C-D49E-5801-45785F9D2A1A}"/>
+              </a:ext>
+            </a:extLst>
+          </p:cNvPr>
+          <p:cNvPicPr>
+            <a:picLocks noChangeAspect="1"/>
+          </p:cNvPicPr>
+          <p:nvPr/>
+        </p:nvPicPr>
+        <p:blipFill>
+          <a:blip r:embed="rId2"/>
+          <a:stretch>
+            <a:fillRect/>
+          </a:stretch>
+        </p:blipFill>
+        <p:spPr>
+          <a:xfrm>
+            <a:off x="1961791" y="514097"/>
+            <a:ext cx="8268417" cy="5829805"/>
+          </a:xfrm>
+          <a:prstGeom prst="rect">
+            <a:avLst/>
+          </a:prstGeom>
+        </p:spPr>
+      </p:pic>
+    </p:spTree>
+    <p:extLst>
+      <p:ext uri="{BB962C8B-B14F-4D97-AF65-F5344CB8AC3E}">
+        <p14:creationId xmlns:p14="http://schemas.microsoft.com/office/powerpoint/2010/main" val="1150135237"/>
+      </p:ext>
+    </p:extLst>
+  </p:cSld>
+  <p:clrMapOvr>
+    <a:masterClrMapping/>
+  </p:clrMapOvr>
+</p:sld>
+</file>
+
 <file path=ppt/slides/slide2.xml><?xml version="1.0" encoding="utf-8"?>
 <p:sld xmlns:a="http://schemas.openxmlformats.org/drawingml/2006/main" xmlns:r="http://schemas.openxmlformats.org/officeDocument/2006/relationships" xmlns:p="http://schemas.openxmlformats.org/presentationml/2006/main">
   <p:cSld>
@@ -7527,7 +8352,7 @@
 </file>
 
 <file path=ppt/slides/slide5.xml><?xml version="1.0" encoding="utf-8"?>
-<p:sld xmlns:a="http://schemas.openxmlformats.org/drawingml/2006/main" xmlns:r="http://schemas.openxmlformats.org/officeDocument/2006/relationships" xmlns:p="http://schemas.openxmlformats.org/presentationml/2006/main">
+<p:sld xmlns:a="http://schemas.openxmlformats.org/drawingml/2006/main" xmlns:r="http://schemas.openxmlformats.org/officeDocument/2006/relationships" xmlns:p="http://schemas.openxmlformats.org/presentationml/2006/main" show="0">
   <p:cSld>
     <p:spTree>
       <p:nvGrpSpPr>
@@ -7633,35 +8458,6 @@
           <a:chExt cx="0" cy="0"/>
         </a:xfrm>
       </p:grpSpPr>
-      <p:pic>
-        <p:nvPicPr>
-          <p:cNvPr id="4" name="Picture 3">
-            <a:extLst>
-              <a:ext uri="{FF2B5EF4-FFF2-40B4-BE49-F238E27FC236}">
-                <a16:creationId xmlns:a16="http://schemas.microsoft.com/office/drawing/2014/main" id="{03796A41-0CCF-9F4B-A398-7EAD09C4528D}"/>
-              </a:ext>
-            </a:extLst>
-          </p:cNvPr>
-          <p:cNvPicPr>
-            <a:picLocks noChangeAspect="1"/>
-          </p:cNvPicPr>
-          <p:nvPr/>
-        </p:nvPicPr>
-        <p:blipFill rotWithShape="1">
-          <a:blip r:embed="rId2"/>
-          <a:srcRect b="26751"/>
-          <a:stretch/>
-        </p:blipFill>
-        <p:spPr>
-          <a:xfrm>
-            <a:off x="768565" y="1027906"/>
-            <a:ext cx="10963330" cy="4851919"/>
-          </a:xfrm>
-          <a:prstGeom prst="rect">
-            <a:avLst/>
-          </a:prstGeom>
-        </p:spPr>
-      </p:pic>
     </p:spTree>
     <p:extLst>
       <p:ext uri="{BB962C8B-B14F-4D97-AF65-F5344CB8AC3E}">
@@ -7813,10 +8609,10 @@
       </p:sp>
       <p:pic>
         <p:nvPicPr>
-          <p:cNvPr id="4" name="Picture 3">
-            <a:extLst>
-              <a:ext uri="{FF2B5EF4-FFF2-40B4-BE49-F238E27FC236}">
-                <a16:creationId xmlns:a16="http://schemas.microsoft.com/office/drawing/2014/main" id="{0ADC1105-82A6-040C-B346-A8EA5D4FAC81}"/>
+          <p:cNvPr id="5" name="Picture 4">
+            <a:extLst>
+              <a:ext uri="{FF2B5EF4-FFF2-40B4-BE49-F238E27FC236}">
+                <a16:creationId xmlns:a16="http://schemas.microsoft.com/office/drawing/2014/main" id="{EACABD60-170B-D8D3-EFF7-0EEA45656117}"/>
               </a:ext>
             </a:extLst>
           </p:cNvPr>
@@ -7833,38 +8629,8 @@
         </p:blipFill>
         <p:spPr>
           <a:xfrm>
-            <a:off x="838200" y="1950577"/>
-            <a:ext cx="3401001" cy="2518786"/>
-          </a:xfrm>
-          <a:prstGeom prst="rect">
-            <a:avLst/>
-          </a:prstGeom>
-        </p:spPr>
-      </p:pic>
-      <p:pic>
-        <p:nvPicPr>
-          <p:cNvPr id="6" name="Picture 5">
-            <a:extLst>
-              <a:ext uri="{FF2B5EF4-FFF2-40B4-BE49-F238E27FC236}">
-                <a16:creationId xmlns:a16="http://schemas.microsoft.com/office/drawing/2014/main" id="{F0CF2923-8926-38FD-1503-3AF5369F5276}"/>
-              </a:ext>
-            </a:extLst>
-          </p:cNvPr>
-          <p:cNvPicPr>
-            <a:picLocks noChangeAspect="1"/>
-          </p:cNvPicPr>
-          <p:nvPr/>
-        </p:nvPicPr>
-        <p:blipFill>
-          <a:blip r:embed="rId3"/>
-          <a:stretch>
-            <a:fillRect/>
-          </a:stretch>
-        </p:blipFill>
-        <p:spPr>
-          <a:xfrm>
-            <a:off x="4639189" y="1950577"/>
-            <a:ext cx="6714611" cy="2826696"/>
+            <a:off x="5057653" y="537193"/>
+            <a:ext cx="6745572" cy="981426"/>
           </a:xfrm>
           <a:prstGeom prst="rect">
             <a:avLst/>
@@ -7875,6 +8641,66 @@
     <p:extLst>
       <p:ext uri="{BB962C8B-B14F-4D97-AF65-F5344CB8AC3E}">
         <p14:creationId xmlns:p14="http://schemas.microsoft.com/office/powerpoint/2010/main" val="3865375027"/>
+      </p:ext>
+    </p:extLst>
+  </p:cSld>
+  <p:clrMapOvr>
+    <a:masterClrMapping/>
+  </p:clrMapOvr>
+</p:sld>
+</file>
+
+<file path=ppt/slides/slide9.xml><?xml version="1.0" encoding="utf-8"?>
+<p:sld xmlns:a="http://schemas.openxmlformats.org/drawingml/2006/main" xmlns:r="http://schemas.openxmlformats.org/officeDocument/2006/relationships" xmlns:p="http://schemas.openxmlformats.org/presentationml/2006/main">
+  <p:cSld>
+    <p:spTree>
+      <p:nvGrpSpPr>
+        <p:cNvPr id="1" name=""/>
+        <p:cNvGrpSpPr/>
+        <p:nvPr/>
+      </p:nvGrpSpPr>
+      <p:grpSpPr>
+        <a:xfrm>
+          <a:off x="0" y="0"/>
+          <a:ext cx="0" cy="0"/>
+          <a:chOff x="0" y="0"/>
+          <a:chExt cx="0" cy="0"/>
+        </a:xfrm>
+      </p:grpSpPr>
+      <p:pic>
+        <p:nvPicPr>
+          <p:cNvPr id="8" name="Picture 7">
+            <a:extLst>
+              <a:ext uri="{FF2B5EF4-FFF2-40B4-BE49-F238E27FC236}">
+                <a16:creationId xmlns:a16="http://schemas.microsoft.com/office/drawing/2014/main" id="{6F0BF296-908E-DA85-A2EB-77E838D18B93}"/>
+              </a:ext>
+            </a:extLst>
+          </p:cNvPr>
+          <p:cNvPicPr>
+            <a:picLocks noChangeAspect="1"/>
+          </p:cNvPicPr>
+          <p:nvPr/>
+        </p:nvPicPr>
+        <p:blipFill>
+          <a:blip r:embed="rId2"/>
+          <a:stretch>
+            <a:fillRect/>
+          </a:stretch>
+        </p:blipFill>
+        <p:spPr>
+          <a:xfrm>
+            <a:off x="1990268" y="409064"/>
+            <a:ext cx="7856901" cy="5517358"/>
+          </a:xfrm>
+          <a:prstGeom prst="rect">
+            <a:avLst/>
+          </a:prstGeom>
+        </p:spPr>
+      </p:pic>
+    </p:spTree>
+    <p:extLst>
+      <p:ext uri="{BB962C8B-B14F-4D97-AF65-F5344CB8AC3E}">
+        <p14:creationId xmlns:p14="http://schemas.microsoft.com/office/powerpoint/2010/main" val="1684589302"/>
       </p:ext>
     </p:extLst>
   </p:cSld>

</xml_diff>